<commit_message>
code from June 28, 2011
</commit_message>
<xml_diff>
--- a/doc/configurations.pptx
+++ b/doc/configurations.pptx
@@ -195,7 +195,8 @@
           <a:p>
             <a:fld id="{4723217D-A6D4-462A-8BE4-4A96E6F4AD3A}" type="datetimeFigureOut">
               <a:rPr lang="en-US" smtClean="0"/>
-              <a:t>6/27/2011</a:t>
+              <a:pPr/>
+              <a:t>6/28/2011</a:t>
             </a:fld>
             <a:endParaRPr lang="en-US"/>
           </a:p>
@@ -354,6 +355,7 @@
           <a:p>
             <a:fld id="{FAE6BF4D-24CC-40B2-96D6-1236C6207408}" type="slidenum">
               <a:rPr lang="en-US" smtClean="0"/>
+              <a:pPr/>
               <a:t>‹#›</a:t>
             </a:fld>
             <a:endParaRPr lang="en-US"/>
@@ -363,7 +365,7 @@
     </p:spTree>
     <p:extLst>
       <p:ext uri="{BB962C8B-B14F-4D97-AF65-F5344CB8AC3E}">
-        <p14:creationId xmlns:p14="http://schemas.microsoft.com/office/powerpoint/2010/main" val="3426798297"/>
+        <p14:creationId xmlns:p14="http://schemas.microsoft.com/office/powerpoint/2010/main" xmlns="" val="3426798297"/>
       </p:ext>
     </p:extLst>
   </p:cSld>
@@ -644,7 +646,8 @@
           <a:p>
             <a:fld id="{D1E9D91C-56F2-424C-ACF0-A4921EAB78A4}" type="datetimeFigureOut">
               <a:rPr lang="en-US" smtClean="0"/>
-              <a:t>6/27/2011</a:t>
+              <a:pPr/>
+              <a:t>6/28/2011</a:t>
             </a:fld>
             <a:endParaRPr lang="en-US"/>
           </a:p>
@@ -686,6 +689,7 @@
           <a:p>
             <a:fld id="{73FD1471-78BF-4D57-ABCF-48B9877514E8}" type="slidenum">
               <a:rPr lang="en-US" smtClean="0"/>
+              <a:pPr/>
               <a:t>‹#›</a:t>
             </a:fld>
             <a:endParaRPr lang="en-US"/>
@@ -809,7 +813,8 @@
           <a:p>
             <a:fld id="{D1E9D91C-56F2-424C-ACF0-A4921EAB78A4}" type="datetimeFigureOut">
               <a:rPr lang="en-US" smtClean="0"/>
-              <a:t>6/27/2011</a:t>
+              <a:pPr/>
+              <a:t>6/28/2011</a:t>
             </a:fld>
             <a:endParaRPr lang="en-US"/>
           </a:p>
@@ -851,6 +856,7 @@
           <a:p>
             <a:fld id="{73FD1471-78BF-4D57-ABCF-48B9877514E8}" type="slidenum">
               <a:rPr lang="en-US" smtClean="0"/>
+              <a:pPr/>
               <a:t>‹#›</a:t>
             </a:fld>
             <a:endParaRPr lang="en-US"/>
@@ -984,7 +990,8 @@
           <a:p>
             <a:fld id="{D1E9D91C-56F2-424C-ACF0-A4921EAB78A4}" type="datetimeFigureOut">
               <a:rPr lang="en-US" smtClean="0"/>
-              <a:t>6/27/2011</a:t>
+              <a:pPr/>
+              <a:t>6/28/2011</a:t>
             </a:fld>
             <a:endParaRPr lang="en-US"/>
           </a:p>
@@ -1026,6 +1033,7 @@
           <a:p>
             <a:fld id="{73FD1471-78BF-4D57-ABCF-48B9877514E8}" type="slidenum">
               <a:rPr lang="en-US" smtClean="0"/>
+              <a:pPr/>
               <a:t>‹#›</a:t>
             </a:fld>
             <a:endParaRPr lang="en-US"/>
@@ -1149,7 +1157,8 @@
           <a:p>
             <a:fld id="{D1E9D91C-56F2-424C-ACF0-A4921EAB78A4}" type="datetimeFigureOut">
               <a:rPr lang="en-US" smtClean="0"/>
-              <a:t>6/27/2011</a:t>
+              <a:pPr/>
+              <a:t>6/28/2011</a:t>
             </a:fld>
             <a:endParaRPr lang="en-US"/>
           </a:p>
@@ -1191,6 +1200,7 @@
           <a:p>
             <a:fld id="{73FD1471-78BF-4D57-ABCF-48B9877514E8}" type="slidenum">
               <a:rPr lang="en-US" smtClean="0"/>
+              <a:pPr/>
               <a:t>‹#›</a:t>
             </a:fld>
             <a:endParaRPr lang="en-US"/>
@@ -1390,7 +1400,8 @@
           <a:p>
             <a:fld id="{D1E9D91C-56F2-424C-ACF0-A4921EAB78A4}" type="datetimeFigureOut">
               <a:rPr lang="en-US" smtClean="0"/>
-              <a:t>6/27/2011</a:t>
+              <a:pPr/>
+              <a:t>6/28/2011</a:t>
             </a:fld>
             <a:endParaRPr lang="en-US"/>
           </a:p>
@@ -1432,6 +1443,7 @@
           <a:p>
             <a:fld id="{73FD1471-78BF-4D57-ABCF-48B9877514E8}" type="slidenum">
               <a:rPr lang="en-US" smtClean="0"/>
+              <a:pPr/>
               <a:t>‹#›</a:t>
             </a:fld>
             <a:endParaRPr lang="en-US"/>
@@ -1673,7 +1685,8 @@
           <a:p>
             <a:fld id="{D1E9D91C-56F2-424C-ACF0-A4921EAB78A4}" type="datetimeFigureOut">
               <a:rPr lang="en-US" smtClean="0"/>
-              <a:t>6/27/2011</a:t>
+              <a:pPr/>
+              <a:t>6/28/2011</a:t>
             </a:fld>
             <a:endParaRPr lang="en-US"/>
           </a:p>
@@ -1715,6 +1728,7 @@
           <a:p>
             <a:fld id="{73FD1471-78BF-4D57-ABCF-48B9877514E8}" type="slidenum">
               <a:rPr lang="en-US" smtClean="0"/>
+              <a:pPr/>
               <a:t>‹#›</a:t>
             </a:fld>
             <a:endParaRPr lang="en-US"/>
@@ -2090,7 +2104,8 @@
           <a:p>
             <a:fld id="{D1E9D91C-56F2-424C-ACF0-A4921EAB78A4}" type="datetimeFigureOut">
               <a:rPr lang="en-US" smtClean="0"/>
-              <a:t>6/27/2011</a:t>
+              <a:pPr/>
+              <a:t>6/28/2011</a:t>
             </a:fld>
             <a:endParaRPr lang="en-US"/>
           </a:p>
@@ -2132,6 +2147,7 @@
           <a:p>
             <a:fld id="{73FD1471-78BF-4D57-ABCF-48B9877514E8}" type="slidenum">
               <a:rPr lang="en-US" smtClean="0"/>
+              <a:pPr/>
               <a:t>‹#›</a:t>
             </a:fld>
             <a:endParaRPr lang="en-US"/>
@@ -2203,7 +2219,8 @@
           <a:p>
             <a:fld id="{D1E9D91C-56F2-424C-ACF0-A4921EAB78A4}" type="datetimeFigureOut">
               <a:rPr lang="en-US" smtClean="0"/>
-              <a:t>6/27/2011</a:t>
+              <a:pPr/>
+              <a:t>6/28/2011</a:t>
             </a:fld>
             <a:endParaRPr lang="en-US"/>
           </a:p>
@@ -2245,6 +2262,7 @@
           <a:p>
             <a:fld id="{73FD1471-78BF-4D57-ABCF-48B9877514E8}" type="slidenum">
               <a:rPr lang="en-US" smtClean="0"/>
+              <a:pPr/>
               <a:t>‹#›</a:t>
             </a:fld>
             <a:endParaRPr lang="en-US"/>
@@ -2293,7 +2311,8 @@
           <a:p>
             <a:fld id="{D1E9D91C-56F2-424C-ACF0-A4921EAB78A4}" type="datetimeFigureOut">
               <a:rPr lang="en-US" smtClean="0"/>
-              <a:t>6/27/2011</a:t>
+              <a:pPr/>
+              <a:t>6/28/2011</a:t>
             </a:fld>
             <a:endParaRPr lang="en-US"/>
           </a:p>
@@ -2335,6 +2354,7 @@
           <a:p>
             <a:fld id="{73FD1471-78BF-4D57-ABCF-48B9877514E8}" type="slidenum">
               <a:rPr lang="en-US" smtClean="0"/>
+              <a:pPr/>
               <a:t>‹#›</a:t>
             </a:fld>
             <a:endParaRPr lang="en-US"/>
@@ -2565,7 +2585,8 @@
           <a:p>
             <a:fld id="{D1E9D91C-56F2-424C-ACF0-A4921EAB78A4}" type="datetimeFigureOut">
               <a:rPr lang="en-US" smtClean="0"/>
-              <a:t>6/27/2011</a:t>
+              <a:pPr/>
+              <a:t>6/28/2011</a:t>
             </a:fld>
             <a:endParaRPr lang="en-US"/>
           </a:p>
@@ -2607,6 +2628,7 @@
           <a:p>
             <a:fld id="{73FD1471-78BF-4D57-ABCF-48B9877514E8}" type="slidenum">
               <a:rPr lang="en-US" smtClean="0"/>
+              <a:pPr/>
               <a:t>‹#›</a:t>
             </a:fld>
             <a:endParaRPr lang="en-US"/>
@@ -2813,7 +2835,8 @@
           <a:p>
             <a:fld id="{D1E9D91C-56F2-424C-ACF0-A4921EAB78A4}" type="datetimeFigureOut">
               <a:rPr lang="en-US" smtClean="0"/>
-              <a:t>6/27/2011</a:t>
+              <a:pPr/>
+              <a:t>6/28/2011</a:t>
             </a:fld>
             <a:endParaRPr lang="en-US"/>
           </a:p>
@@ -2855,6 +2878,7 @@
           <a:p>
             <a:fld id="{73FD1471-78BF-4D57-ABCF-48B9877514E8}" type="slidenum">
               <a:rPr lang="en-US" smtClean="0"/>
+              <a:pPr/>
               <a:t>‹#›</a:t>
             </a:fld>
             <a:endParaRPr lang="en-US"/>
@@ -3021,7 +3045,8 @@
           <a:p>
             <a:fld id="{D1E9D91C-56F2-424C-ACF0-A4921EAB78A4}" type="datetimeFigureOut">
               <a:rPr lang="en-US" smtClean="0"/>
-              <a:t>6/27/2011</a:t>
+              <a:pPr/>
+              <a:t>6/28/2011</a:t>
             </a:fld>
             <a:endParaRPr lang="en-US"/>
           </a:p>
@@ -3099,6 +3124,7 @@
           <a:p>
             <a:fld id="{73FD1471-78BF-4D57-ABCF-48B9877514E8}" type="slidenum">
               <a:rPr lang="en-US" smtClean="0"/>
+              <a:pPr/>
               <a:t>‹#›</a:t>
             </a:fld>
             <a:endParaRPr lang="en-US"/>
@@ -3463,7 +3489,7 @@
     </p:spTree>
     <p:extLst>
       <p:ext uri="{BB962C8B-B14F-4D97-AF65-F5344CB8AC3E}">
-        <p14:creationId xmlns:p14="http://schemas.microsoft.com/office/powerpoint/2010/main" val="45139390"/>
+        <p14:creationId xmlns:p14="http://schemas.microsoft.com/office/powerpoint/2010/main" xmlns="" val="45139390"/>
       </p:ext>
     </p:extLst>
   </p:cSld>

</xml_diff>